<commit_message>
skrevet i word-fil, endret småting i pptx
</commit_message>
<xml_diff>
--- a/Resultat.pptx
+++ b/Resultat.pptx
@@ -300,7 +300,7 @@
           <a:p>
             <a:fld id="{BA8802E3-27EA-4165-B78D-6090480ADFDD}" type="datetimeFigureOut">
               <a:rPr lang="nb-NO" smtClean="0"/>
-              <a:t>06.07.2021</a:t>
+              <a:t>08.07.2021</a:t>
             </a:fld>
             <a:endParaRPr lang="nb-NO"/>
           </a:p>
@@ -498,7 +498,7 @@
           <a:p>
             <a:fld id="{BA8802E3-27EA-4165-B78D-6090480ADFDD}" type="datetimeFigureOut">
               <a:rPr lang="nb-NO" smtClean="0"/>
-              <a:t>06.07.2021</a:t>
+              <a:t>08.07.2021</a:t>
             </a:fld>
             <a:endParaRPr lang="nb-NO"/>
           </a:p>
@@ -706,7 +706,7 @@
           <a:p>
             <a:fld id="{BA8802E3-27EA-4165-B78D-6090480ADFDD}" type="datetimeFigureOut">
               <a:rPr lang="nb-NO" smtClean="0"/>
-              <a:t>06.07.2021</a:t>
+              <a:t>08.07.2021</a:t>
             </a:fld>
             <a:endParaRPr lang="nb-NO"/>
           </a:p>
@@ -904,7 +904,7 @@
           <a:p>
             <a:fld id="{BA8802E3-27EA-4165-B78D-6090480ADFDD}" type="datetimeFigureOut">
               <a:rPr lang="nb-NO" smtClean="0"/>
-              <a:t>06.07.2021</a:t>
+              <a:t>08.07.2021</a:t>
             </a:fld>
             <a:endParaRPr lang="nb-NO"/>
           </a:p>
@@ -1179,7 +1179,7 @@
           <a:p>
             <a:fld id="{BA8802E3-27EA-4165-B78D-6090480ADFDD}" type="datetimeFigureOut">
               <a:rPr lang="nb-NO" smtClean="0"/>
-              <a:t>06.07.2021</a:t>
+              <a:t>08.07.2021</a:t>
             </a:fld>
             <a:endParaRPr lang="nb-NO"/>
           </a:p>
@@ -1444,7 +1444,7 @@
           <a:p>
             <a:fld id="{BA8802E3-27EA-4165-B78D-6090480ADFDD}" type="datetimeFigureOut">
               <a:rPr lang="nb-NO" smtClean="0"/>
-              <a:t>06.07.2021</a:t>
+              <a:t>08.07.2021</a:t>
             </a:fld>
             <a:endParaRPr lang="nb-NO"/>
           </a:p>
@@ -1856,7 +1856,7 @@
           <a:p>
             <a:fld id="{BA8802E3-27EA-4165-B78D-6090480ADFDD}" type="datetimeFigureOut">
               <a:rPr lang="nb-NO" smtClean="0"/>
-              <a:t>06.07.2021</a:t>
+              <a:t>08.07.2021</a:t>
             </a:fld>
             <a:endParaRPr lang="nb-NO"/>
           </a:p>
@@ -1997,7 +1997,7 @@
           <a:p>
             <a:fld id="{BA8802E3-27EA-4165-B78D-6090480ADFDD}" type="datetimeFigureOut">
               <a:rPr lang="nb-NO" smtClean="0"/>
-              <a:t>06.07.2021</a:t>
+              <a:t>08.07.2021</a:t>
             </a:fld>
             <a:endParaRPr lang="nb-NO"/>
           </a:p>
@@ -2110,7 +2110,7 @@
           <a:p>
             <a:fld id="{BA8802E3-27EA-4165-B78D-6090480ADFDD}" type="datetimeFigureOut">
               <a:rPr lang="nb-NO" smtClean="0"/>
-              <a:t>06.07.2021</a:t>
+              <a:t>08.07.2021</a:t>
             </a:fld>
             <a:endParaRPr lang="nb-NO"/>
           </a:p>
@@ -2421,7 +2421,7 @@
           <a:p>
             <a:fld id="{BA8802E3-27EA-4165-B78D-6090480ADFDD}" type="datetimeFigureOut">
               <a:rPr lang="nb-NO" smtClean="0"/>
-              <a:t>06.07.2021</a:t>
+              <a:t>08.07.2021</a:t>
             </a:fld>
             <a:endParaRPr lang="nb-NO"/>
           </a:p>
@@ -2709,7 +2709,7 @@
           <a:p>
             <a:fld id="{BA8802E3-27EA-4165-B78D-6090480ADFDD}" type="datetimeFigureOut">
               <a:rPr lang="nb-NO" smtClean="0"/>
-              <a:t>06.07.2021</a:t>
+              <a:t>08.07.2021</a:t>
             </a:fld>
             <a:endParaRPr lang="nb-NO"/>
           </a:p>
@@ -2950,7 +2950,7 @@
           <a:p>
             <a:fld id="{BA8802E3-27EA-4165-B78D-6090480ADFDD}" type="datetimeFigureOut">
               <a:rPr lang="nb-NO" smtClean="0"/>
-              <a:t>06.07.2021</a:t>
+              <a:t>08.07.2021</a:t>
             </a:fld>
             <a:endParaRPr lang="nb-NO"/>
           </a:p>
@@ -4373,6 +4373,58 @@
           </a:p>
         </p:txBody>
       </p:sp>
+      <p:sp>
+        <p:nvSpPr>
+          <p:cNvPr id="2" name="Rektangel 1">
+            <a:extLst>
+              <a:ext uri="{FF2B5EF4-FFF2-40B4-BE49-F238E27FC236}">
+                <a16:creationId xmlns:a16="http://schemas.microsoft.com/office/drawing/2014/main" id="{2C3C3DDB-4940-45E7-AEED-BFCCAF15036F}"/>
+              </a:ext>
+            </a:extLst>
+          </p:cNvPr>
+          <p:cNvSpPr/>
+          <p:nvPr/>
+        </p:nvSpPr>
+        <p:spPr>
+          <a:xfrm>
+            <a:off x="3923930" y="2407298"/>
+            <a:ext cx="2172070" cy="1021702"/>
+          </a:xfrm>
+          <a:prstGeom prst="rect">
+            <a:avLst/>
+          </a:prstGeom>
+          <a:noFill/>
+          <a:ln>
+            <a:solidFill>
+              <a:srgbClr val="FF0000"/>
+            </a:solidFill>
+          </a:ln>
+        </p:spPr>
+        <p:style>
+          <a:lnRef idx="2">
+            <a:schemeClr val="accent1">
+              <a:shade val="50000"/>
+            </a:schemeClr>
+          </a:lnRef>
+          <a:fillRef idx="1">
+            <a:schemeClr val="accent1"/>
+          </a:fillRef>
+          <a:effectRef idx="0">
+            <a:schemeClr val="accent1"/>
+          </a:effectRef>
+          <a:fontRef idx="minor">
+            <a:schemeClr val="lt1"/>
+          </a:fontRef>
+        </p:style>
+        <p:txBody>
+          <a:bodyPr rtlCol="0" anchor="ctr"/>
+          <a:lstStyle/>
+          <a:p>
+            <a:pPr algn="ctr"/>
+            <a:endParaRPr lang="nb-NO"/>
+          </a:p>
+        </p:txBody>
+      </p:sp>
     </p:spTree>
     <p:extLst>
       <p:ext uri="{BB962C8B-B14F-4D97-AF65-F5344CB8AC3E}">
@@ -5889,6 +5941,58 @@
           <a:xfrm>
             <a:off x="6096000" y="5894773"/>
             <a:ext cx="2124722" cy="914400"/>
+          </a:xfrm>
+          <a:prstGeom prst="rect">
+            <a:avLst/>
+          </a:prstGeom>
+          <a:noFill/>
+          <a:ln>
+            <a:solidFill>
+              <a:srgbClr val="FF0000"/>
+            </a:solidFill>
+          </a:ln>
+        </p:spPr>
+        <p:style>
+          <a:lnRef idx="2">
+            <a:schemeClr val="accent1">
+              <a:shade val="50000"/>
+            </a:schemeClr>
+          </a:lnRef>
+          <a:fillRef idx="1">
+            <a:schemeClr val="accent1"/>
+          </a:fillRef>
+          <a:effectRef idx="0">
+            <a:schemeClr val="accent1"/>
+          </a:effectRef>
+          <a:fontRef idx="minor">
+            <a:schemeClr val="lt1"/>
+          </a:fontRef>
+        </p:style>
+        <p:txBody>
+          <a:bodyPr rtlCol="0" anchor="ctr"/>
+          <a:lstStyle/>
+          <a:p>
+            <a:pPr algn="ctr"/>
+            <a:endParaRPr lang="nb-NO"/>
+          </a:p>
+        </p:txBody>
+      </p:sp>
+      <p:sp>
+        <p:nvSpPr>
+          <p:cNvPr id="7" name="Rektangel 6">
+            <a:extLst>
+              <a:ext uri="{FF2B5EF4-FFF2-40B4-BE49-F238E27FC236}">
+                <a16:creationId xmlns:a16="http://schemas.microsoft.com/office/drawing/2014/main" id="{3366D132-DD05-499B-8E2D-7EB11980C80D}"/>
+              </a:ext>
+            </a:extLst>
+          </p:cNvPr>
+          <p:cNvSpPr/>
+          <p:nvPr/>
+        </p:nvSpPr>
+        <p:spPr>
+          <a:xfrm>
+            <a:off x="3923930" y="1017037"/>
+            <a:ext cx="2124722" cy="979714"/>
           </a:xfrm>
           <a:prstGeom prst="rect">
             <a:avLst/>

</xml_diff>